<commit_message>
Update workflow diagram, add numbers to script actions
</commit_message>
<xml_diff>
--- a/assets/Workflow.pptx
+++ b/assets/Workflow.pptx
@@ -244,7 +244,7 @@
           <a:p>
             <a:fld id="{F1DFEE79-E53D-48D5-A539-1A6C3412748C}" type="datetimeFigureOut">
               <a:rPr lang="en-US" smtClean="0"/>
-              <a:t>23-Jul-19</a:t>
+              <a:t>8/25/2019</a:t>
             </a:fld>
             <a:endParaRPr lang="en-US"/>
           </a:p>
@@ -414,7 +414,7 @@
           <a:p>
             <a:fld id="{F1DFEE79-E53D-48D5-A539-1A6C3412748C}" type="datetimeFigureOut">
               <a:rPr lang="en-US" smtClean="0"/>
-              <a:t>23-Jul-19</a:t>
+              <a:t>8/25/2019</a:t>
             </a:fld>
             <a:endParaRPr lang="en-US"/>
           </a:p>
@@ -594,7 +594,7 @@
           <a:p>
             <a:fld id="{F1DFEE79-E53D-48D5-A539-1A6C3412748C}" type="datetimeFigureOut">
               <a:rPr lang="en-US" smtClean="0"/>
-              <a:t>23-Jul-19</a:t>
+              <a:t>8/25/2019</a:t>
             </a:fld>
             <a:endParaRPr lang="en-US"/>
           </a:p>
@@ -764,7 +764,7 @@
           <a:p>
             <a:fld id="{F1DFEE79-E53D-48D5-A539-1A6C3412748C}" type="datetimeFigureOut">
               <a:rPr lang="en-US" smtClean="0"/>
-              <a:t>23-Jul-19</a:t>
+              <a:t>8/25/2019</a:t>
             </a:fld>
             <a:endParaRPr lang="en-US"/>
           </a:p>
@@ -1008,7 +1008,7 @@
           <a:p>
             <a:fld id="{F1DFEE79-E53D-48D5-A539-1A6C3412748C}" type="datetimeFigureOut">
               <a:rPr lang="en-US" smtClean="0"/>
-              <a:t>23-Jul-19</a:t>
+              <a:t>8/25/2019</a:t>
             </a:fld>
             <a:endParaRPr lang="en-US"/>
           </a:p>
@@ -1240,7 +1240,7 @@
           <a:p>
             <a:fld id="{F1DFEE79-E53D-48D5-A539-1A6C3412748C}" type="datetimeFigureOut">
               <a:rPr lang="en-US" smtClean="0"/>
-              <a:t>23-Jul-19</a:t>
+              <a:t>8/25/2019</a:t>
             </a:fld>
             <a:endParaRPr lang="en-US"/>
           </a:p>
@@ -1607,7 +1607,7 @@
           <a:p>
             <a:fld id="{F1DFEE79-E53D-48D5-A539-1A6C3412748C}" type="datetimeFigureOut">
               <a:rPr lang="en-US" smtClean="0"/>
-              <a:t>23-Jul-19</a:t>
+              <a:t>8/25/2019</a:t>
             </a:fld>
             <a:endParaRPr lang="en-US"/>
           </a:p>
@@ -1725,7 +1725,7 @@
           <a:p>
             <a:fld id="{F1DFEE79-E53D-48D5-A539-1A6C3412748C}" type="datetimeFigureOut">
               <a:rPr lang="en-US" smtClean="0"/>
-              <a:t>23-Jul-19</a:t>
+              <a:t>8/25/2019</a:t>
             </a:fld>
             <a:endParaRPr lang="en-US"/>
           </a:p>
@@ -1820,7 +1820,7 @@
           <a:p>
             <a:fld id="{F1DFEE79-E53D-48D5-A539-1A6C3412748C}" type="datetimeFigureOut">
               <a:rPr lang="en-US" smtClean="0"/>
-              <a:t>23-Jul-19</a:t>
+              <a:t>8/25/2019</a:t>
             </a:fld>
             <a:endParaRPr lang="en-US"/>
           </a:p>
@@ -2097,7 +2097,7 @@
           <a:p>
             <a:fld id="{F1DFEE79-E53D-48D5-A539-1A6C3412748C}" type="datetimeFigureOut">
               <a:rPr lang="en-US" smtClean="0"/>
-              <a:t>23-Jul-19</a:t>
+              <a:t>8/25/2019</a:t>
             </a:fld>
             <a:endParaRPr lang="en-US"/>
           </a:p>
@@ -2354,7 +2354,7 @@
           <a:p>
             <a:fld id="{F1DFEE79-E53D-48D5-A539-1A6C3412748C}" type="datetimeFigureOut">
               <a:rPr lang="en-US" smtClean="0"/>
-              <a:t>23-Jul-19</a:t>
+              <a:t>8/25/2019</a:t>
             </a:fld>
             <a:endParaRPr lang="en-US"/>
           </a:p>
@@ -2567,7 +2567,7 @@
           <a:p>
             <a:fld id="{F1DFEE79-E53D-48D5-A539-1A6C3412748C}" type="datetimeFigureOut">
               <a:rPr lang="en-US" smtClean="0"/>
-              <a:t>23-Jul-19</a:t>
+              <a:t>8/25/2019</a:t>
             </a:fld>
             <a:endParaRPr lang="en-US"/>
           </a:p>
@@ -8909,127 +8909,6 @@
           </a:p>
         </p:txBody>
       </p:sp>
-      <p:sp>
-        <p:nvSpPr>
-          <p:cNvPr id="128" name="Smiley Face 115"/>
-          <p:cNvSpPr/>
-          <p:nvPr/>
-        </p:nvSpPr>
-        <p:spPr>
-          <a:xfrm>
-            <a:off x="1563082" y="2331813"/>
-            <a:ext cx="289166" cy="289166"/>
-          </a:xfrm>
-          <a:prstGeom prst="smileyFace">
-            <a:avLst/>
-          </a:prstGeom>
-          <a:noFill/>
-          <a:ln>
-            <a:solidFill>
-              <a:srgbClr val="C00000"/>
-            </a:solidFill>
-          </a:ln>
-        </p:spPr>
-        <p:style>
-          <a:lnRef idx="2">
-            <a:schemeClr val="accent1">
-              <a:shade val="50000"/>
-            </a:schemeClr>
-          </a:lnRef>
-          <a:fillRef idx="1">
-            <a:schemeClr val="accent1"/>
-          </a:fillRef>
-          <a:effectRef idx="0">
-            <a:schemeClr val="accent1"/>
-          </a:effectRef>
-          <a:fontRef idx="minor">
-            <a:schemeClr val="lt1"/>
-          </a:fontRef>
-        </p:style>
-        <p:txBody>
-          <a:bodyPr rtlCol="0" anchor="ctr"/>
-          <a:lstStyle/>
-          <a:p>
-            <a:pPr algn="ctr"/>
-            <a:endParaRPr lang="en-US" sz="900">
-              <a:solidFill>
-                <a:schemeClr val="tx1"/>
-              </a:solidFill>
-            </a:endParaRPr>
-          </a:p>
-        </p:txBody>
-      </p:sp>
-      <p:sp>
-        <p:nvSpPr>
-          <p:cNvPr id="135" name="TextBox 127"/>
-          <p:cNvSpPr txBox="1"/>
-          <p:nvPr/>
-        </p:nvSpPr>
-        <p:spPr>
-          <a:xfrm>
-            <a:off x="1503489" y="2119497"/>
-            <a:ext cx="408352" cy="230832"/>
-          </a:xfrm>
-          <a:prstGeom prst="rect">
-            <a:avLst/>
-          </a:prstGeom>
-          <a:noFill/>
-          <a:ln>
-            <a:noFill/>
-          </a:ln>
-        </p:spPr>
-        <p:txBody>
-          <a:bodyPr wrap="square" rtlCol="0">
-            <a:spAutoFit/>
-          </a:bodyPr>
-          <a:lstStyle/>
-          <a:p>
-            <a:pPr algn="ctr"/>
-            <a:r>
-              <a:rPr lang="en-US" sz="900" dirty="0" smtClean="0"/>
-              <a:t>prof</a:t>
-            </a:r>
-            <a:endParaRPr lang="en-US" sz="900" dirty="0"/>
-          </a:p>
-        </p:txBody>
-      </p:sp>
-      <p:cxnSp>
-        <p:nvCxnSpPr>
-          <p:cNvPr id="136" name="Straight Arrow Connector 134"/>
-          <p:cNvCxnSpPr/>
-          <p:nvPr/>
-        </p:nvCxnSpPr>
-        <p:spPr>
-          <a:xfrm flipH="1">
-            <a:off x="978882" y="2613301"/>
-            <a:ext cx="524607" cy="326015"/>
-          </a:xfrm>
-          <a:prstGeom prst="straightConnector1">
-            <a:avLst/>
-          </a:prstGeom>
-          <a:ln w="12700">
-            <a:solidFill>
-              <a:srgbClr val="C00000"/>
-            </a:solidFill>
-            <a:prstDash val="sysDot"/>
-            <a:tailEnd type="triangle"/>
-          </a:ln>
-        </p:spPr>
-        <p:style>
-          <a:lnRef idx="1">
-            <a:schemeClr val="accent1"/>
-          </a:lnRef>
-          <a:fillRef idx="0">
-            <a:schemeClr val="accent1"/>
-          </a:fillRef>
-          <a:effectRef idx="0">
-            <a:schemeClr val="accent1"/>
-          </a:effectRef>
-          <a:fontRef idx="minor">
-            <a:schemeClr val="tx1"/>
-          </a:fontRef>
-        </p:style>
-      </p:cxnSp>
       <p:cxnSp>
         <p:nvCxnSpPr>
           <p:cNvPr id="137" name="Straight Arrow Connector 135"/>
@@ -9048,6 +8927,9 @@
             <a:avLst/>
           </a:prstGeom>
           <a:ln w="12700">
+            <a:solidFill>
+              <a:srgbClr val="FF0000"/>
+            </a:solidFill>
             <a:tailEnd type="triangle"/>
           </a:ln>
         </p:spPr>
@@ -9084,6 +8966,9 @@
             <a:avLst/>
           </a:prstGeom>
           <a:ln w="12700">
+            <a:solidFill>
+              <a:srgbClr val="FF0000"/>
+            </a:solidFill>
             <a:tailEnd type="triangle"/>
           </a:ln>
         </p:spPr>
@@ -9110,7 +8995,7 @@
         </p:nvSpPr>
         <p:spPr>
           <a:xfrm>
-            <a:off x="3205820" y="2159661"/>
+            <a:off x="3166148" y="2562745"/>
             <a:ext cx="515815" cy="230832"/>
           </a:xfrm>
           <a:prstGeom prst="rect">
@@ -9134,72 +9019,19 @@
       </p:sp>
       <p:sp>
         <p:nvSpPr>
-          <p:cNvPr id="147" name="Smiley Face 145"/>
-          <p:cNvSpPr/>
-          <p:nvPr/>
-        </p:nvSpPr>
-        <p:spPr>
-          <a:xfrm>
-            <a:off x="3313283" y="1483738"/>
-            <a:ext cx="289166" cy="289166"/>
-          </a:xfrm>
-          <a:prstGeom prst="smileyFace">
+          <p:cNvPr id="150" name="TextBox 148"/>
+          <p:cNvSpPr txBox="1"/>
+          <p:nvPr/>
+        </p:nvSpPr>
+        <p:spPr>
+          <a:xfrm>
+            <a:off x="6795056" y="2547393"/>
+            <a:ext cx="515815" cy="230832"/>
+          </a:xfrm>
+          <a:prstGeom prst="rect">
             <a:avLst/>
           </a:prstGeom>
           <a:noFill/>
-          <a:ln>
-            <a:solidFill>
-              <a:srgbClr val="C00000"/>
-            </a:solidFill>
-          </a:ln>
-        </p:spPr>
-        <p:style>
-          <a:lnRef idx="2">
-            <a:schemeClr val="accent1">
-              <a:shade val="50000"/>
-            </a:schemeClr>
-          </a:lnRef>
-          <a:fillRef idx="1">
-            <a:schemeClr val="accent1"/>
-          </a:fillRef>
-          <a:effectRef idx="0">
-            <a:schemeClr val="accent1"/>
-          </a:effectRef>
-          <a:fontRef idx="minor">
-            <a:schemeClr val="lt1"/>
-          </a:fontRef>
-        </p:style>
-        <p:txBody>
-          <a:bodyPr rtlCol="0" anchor="ctr"/>
-          <a:lstStyle/>
-          <a:p>
-            <a:pPr algn="ctr"/>
-            <a:endParaRPr lang="en-US" sz="900">
-              <a:solidFill>
-                <a:schemeClr val="tx1"/>
-              </a:solidFill>
-            </a:endParaRPr>
-          </a:p>
-        </p:txBody>
-      </p:sp>
-      <p:sp>
-        <p:nvSpPr>
-          <p:cNvPr id="148" name="TextBox 146"/>
-          <p:cNvSpPr txBox="1"/>
-          <p:nvPr/>
-        </p:nvSpPr>
-        <p:spPr>
-          <a:xfrm>
-            <a:off x="3253690" y="1271422"/>
-            <a:ext cx="408352" cy="230832"/>
-          </a:xfrm>
-          <a:prstGeom prst="rect">
-            <a:avLst/>
-          </a:prstGeom>
-          <a:noFill/>
-          <a:ln>
-            <a:noFill/>
-          </a:ln>
         </p:spPr>
         <p:txBody>
           <a:bodyPr wrap="square" rtlCol="0">
@@ -9207,74 +9039,6 @@
           </a:bodyPr>
           <a:lstStyle/>
           <a:p>
-            <a:pPr algn="ctr"/>
-            <a:r>
-              <a:rPr lang="en-US" sz="900" dirty="0" smtClean="0"/>
-              <a:t>prof</a:t>
-            </a:r>
-            <a:endParaRPr lang="en-US" sz="900" dirty="0"/>
-          </a:p>
-        </p:txBody>
-      </p:sp>
-      <p:cxnSp>
-        <p:nvCxnSpPr>
-          <p:cNvPr id="149" name="Straight Arrow Connector 147"/>
-          <p:cNvCxnSpPr/>
-          <p:nvPr/>
-        </p:nvCxnSpPr>
-        <p:spPr>
-          <a:xfrm>
-            <a:off x="3457866" y="1873655"/>
-            <a:ext cx="5862" cy="187292"/>
-          </a:xfrm>
-          <a:prstGeom prst="straightConnector1">
-            <a:avLst/>
-          </a:prstGeom>
-          <a:ln w="12700">
-            <a:solidFill>
-              <a:srgbClr val="C00000"/>
-            </a:solidFill>
-            <a:prstDash val="sysDot"/>
-            <a:tailEnd type="triangle"/>
-          </a:ln>
-        </p:spPr>
-        <p:style>
-          <a:lnRef idx="1">
-            <a:schemeClr val="accent1"/>
-          </a:lnRef>
-          <a:fillRef idx="0">
-            <a:schemeClr val="accent1"/>
-          </a:fillRef>
-          <a:effectRef idx="0">
-            <a:schemeClr val="accent1"/>
-          </a:effectRef>
-          <a:fontRef idx="minor">
-            <a:schemeClr val="tx1"/>
-          </a:fontRef>
-        </p:style>
-      </p:cxnSp>
-      <p:sp>
-        <p:nvSpPr>
-          <p:cNvPr id="150" name="TextBox 148"/>
-          <p:cNvSpPr txBox="1"/>
-          <p:nvPr/>
-        </p:nvSpPr>
-        <p:spPr>
-          <a:xfrm>
-            <a:off x="6834728" y="2144309"/>
-            <a:ext cx="515815" cy="230832"/>
-          </a:xfrm>
-          <a:prstGeom prst="rect">
-            <a:avLst/>
-          </a:prstGeom>
-          <a:noFill/>
-        </p:spPr>
-        <p:txBody>
-          <a:bodyPr wrap="square" rtlCol="0">
-            <a:spAutoFit/>
-          </a:bodyPr>
-          <a:lstStyle/>
-          <a:p>
             <a:r>
               <a:rPr lang="en-US" sz="900" dirty="0" smtClean="0"/>
               <a:t>script</a:t>
@@ -9283,127 +9047,6 @@
           </a:p>
         </p:txBody>
       </p:sp>
-      <p:sp>
-        <p:nvSpPr>
-          <p:cNvPr id="151" name="Smiley Face 149"/>
-          <p:cNvSpPr/>
-          <p:nvPr/>
-        </p:nvSpPr>
-        <p:spPr>
-          <a:xfrm>
-            <a:off x="6942191" y="1468386"/>
-            <a:ext cx="289166" cy="289166"/>
-          </a:xfrm>
-          <a:prstGeom prst="smileyFace">
-            <a:avLst/>
-          </a:prstGeom>
-          <a:noFill/>
-          <a:ln>
-            <a:solidFill>
-              <a:srgbClr val="C00000"/>
-            </a:solidFill>
-          </a:ln>
-        </p:spPr>
-        <p:style>
-          <a:lnRef idx="2">
-            <a:schemeClr val="accent1">
-              <a:shade val="50000"/>
-            </a:schemeClr>
-          </a:lnRef>
-          <a:fillRef idx="1">
-            <a:schemeClr val="accent1"/>
-          </a:fillRef>
-          <a:effectRef idx="0">
-            <a:schemeClr val="accent1"/>
-          </a:effectRef>
-          <a:fontRef idx="minor">
-            <a:schemeClr val="lt1"/>
-          </a:fontRef>
-        </p:style>
-        <p:txBody>
-          <a:bodyPr rtlCol="0" anchor="ctr"/>
-          <a:lstStyle/>
-          <a:p>
-            <a:pPr algn="ctr"/>
-            <a:endParaRPr lang="en-US" sz="900">
-              <a:solidFill>
-                <a:schemeClr val="tx1"/>
-              </a:solidFill>
-            </a:endParaRPr>
-          </a:p>
-        </p:txBody>
-      </p:sp>
-      <p:sp>
-        <p:nvSpPr>
-          <p:cNvPr id="152" name="TextBox 150"/>
-          <p:cNvSpPr txBox="1"/>
-          <p:nvPr/>
-        </p:nvSpPr>
-        <p:spPr>
-          <a:xfrm>
-            <a:off x="6882598" y="1256070"/>
-            <a:ext cx="408352" cy="230832"/>
-          </a:xfrm>
-          <a:prstGeom prst="rect">
-            <a:avLst/>
-          </a:prstGeom>
-          <a:noFill/>
-          <a:ln>
-            <a:noFill/>
-          </a:ln>
-        </p:spPr>
-        <p:txBody>
-          <a:bodyPr wrap="square" rtlCol="0">
-            <a:spAutoFit/>
-          </a:bodyPr>
-          <a:lstStyle/>
-          <a:p>
-            <a:pPr algn="ctr"/>
-            <a:r>
-              <a:rPr lang="en-US" sz="900" dirty="0" smtClean="0"/>
-              <a:t>prof</a:t>
-            </a:r>
-            <a:endParaRPr lang="en-US" sz="900" dirty="0"/>
-          </a:p>
-        </p:txBody>
-      </p:sp>
-      <p:cxnSp>
-        <p:nvCxnSpPr>
-          <p:cNvPr id="153" name="Straight Arrow Connector 151"/>
-          <p:cNvCxnSpPr/>
-          <p:nvPr/>
-        </p:nvCxnSpPr>
-        <p:spPr>
-          <a:xfrm>
-            <a:off x="7086774" y="1858303"/>
-            <a:ext cx="5862" cy="187292"/>
-          </a:xfrm>
-          <a:prstGeom prst="straightConnector1">
-            <a:avLst/>
-          </a:prstGeom>
-          <a:ln w="12700">
-            <a:solidFill>
-              <a:srgbClr val="C00000"/>
-            </a:solidFill>
-            <a:prstDash val="sysDot"/>
-            <a:tailEnd type="triangle"/>
-          </a:ln>
-        </p:spPr>
-        <p:style>
-          <a:lnRef idx="1">
-            <a:schemeClr val="accent1"/>
-          </a:lnRef>
-          <a:fillRef idx="0">
-            <a:schemeClr val="accent1"/>
-          </a:fillRef>
-          <a:effectRef idx="0">
-            <a:schemeClr val="accent1"/>
-          </a:effectRef>
-          <a:fontRef idx="minor">
-            <a:schemeClr val="tx1"/>
-          </a:fontRef>
-        </p:style>
-      </p:cxnSp>
       <p:sp>
         <p:nvSpPr>
           <p:cNvPr id="154" name="Smiley Face 152"/>
@@ -10187,7 +9830,7 @@
         </p:nvSpPr>
         <p:spPr>
           <a:xfrm>
-            <a:off x="4948102" y="2167858"/>
+            <a:off x="4908430" y="2570942"/>
             <a:ext cx="515815" cy="230832"/>
           </a:xfrm>
           <a:prstGeom prst="rect">
@@ -10209,127 +9852,6 @@
           </a:p>
         </p:txBody>
       </p:sp>
-      <p:sp>
-        <p:nvSpPr>
-          <p:cNvPr id="172" name="Smiley Face 170"/>
-          <p:cNvSpPr/>
-          <p:nvPr/>
-        </p:nvSpPr>
-        <p:spPr>
-          <a:xfrm>
-            <a:off x="5055565" y="1491935"/>
-            <a:ext cx="289166" cy="289166"/>
-          </a:xfrm>
-          <a:prstGeom prst="smileyFace">
-            <a:avLst/>
-          </a:prstGeom>
-          <a:noFill/>
-          <a:ln>
-            <a:solidFill>
-              <a:srgbClr val="C00000"/>
-            </a:solidFill>
-          </a:ln>
-        </p:spPr>
-        <p:style>
-          <a:lnRef idx="2">
-            <a:schemeClr val="accent1">
-              <a:shade val="50000"/>
-            </a:schemeClr>
-          </a:lnRef>
-          <a:fillRef idx="1">
-            <a:schemeClr val="accent1"/>
-          </a:fillRef>
-          <a:effectRef idx="0">
-            <a:schemeClr val="accent1"/>
-          </a:effectRef>
-          <a:fontRef idx="minor">
-            <a:schemeClr val="lt1"/>
-          </a:fontRef>
-        </p:style>
-        <p:txBody>
-          <a:bodyPr rtlCol="0" anchor="ctr"/>
-          <a:lstStyle/>
-          <a:p>
-            <a:pPr algn="ctr"/>
-            <a:endParaRPr lang="en-US" sz="900">
-              <a:solidFill>
-                <a:schemeClr val="tx1"/>
-              </a:solidFill>
-            </a:endParaRPr>
-          </a:p>
-        </p:txBody>
-      </p:sp>
-      <p:sp>
-        <p:nvSpPr>
-          <p:cNvPr id="173" name="TextBox 171"/>
-          <p:cNvSpPr txBox="1"/>
-          <p:nvPr/>
-        </p:nvSpPr>
-        <p:spPr>
-          <a:xfrm>
-            <a:off x="4995972" y="1279619"/>
-            <a:ext cx="408352" cy="230832"/>
-          </a:xfrm>
-          <a:prstGeom prst="rect">
-            <a:avLst/>
-          </a:prstGeom>
-          <a:noFill/>
-          <a:ln>
-            <a:noFill/>
-          </a:ln>
-        </p:spPr>
-        <p:txBody>
-          <a:bodyPr wrap="square" rtlCol="0">
-            <a:spAutoFit/>
-          </a:bodyPr>
-          <a:lstStyle/>
-          <a:p>
-            <a:pPr algn="ctr"/>
-            <a:r>
-              <a:rPr lang="en-US" sz="900" dirty="0" smtClean="0"/>
-              <a:t>prof</a:t>
-            </a:r>
-            <a:endParaRPr lang="en-US" sz="900" dirty="0"/>
-          </a:p>
-        </p:txBody>
-      </p:sp>
-      <p:cxnSp>
-        <p:nvCxnSpPr>
-          <p:cNvPr id="174" name="Straight Arrow Connector 172"/>
-          <p:cNvCxnSpPr/>
-          <p:nvPr/>
-        </p:nvCxnSpPr>
-        <p:spPr>
-          <a:xfrm>
-            <a:off x="5200148" y="1881852"/>
-            <a:ext cx="5862" cy="187292"/>
-          </a:xfrm>
-          <a:prstGeom prst="straightConnector1">
-            <a:avLst/>
-          </a:prstGeom>
-          <a:ln w="12700">
-            <a:solidFill>
-              <a:srgbClr val="C00000"/>
-            </a:solidFill>
-            <a:prstDash val="sysDot"/>
-            <a:tailEnd type="triangle"/>
-          </a:ln>
-        </p:spPr>
-        <p:style>
-          <a:lnRef idx="1">
-            <a:schemeClr val="accent1"/>
-          </a:lnRef>
-          <a:fillRef idx="0">
-            <a:schemeClr val="accent1"/>
-          </a:fillRef>
-          <a:effectRef idx="0">
-            <a:schemeClr val="accent1"/>
-          </a:effectRef>
-          <a:fontRef idx="minor">
-            <a:schemeClr val="tx1"/>
-          </a:fontRef>
-        </p:style>
-      </p:cxnSp>
       <p:sp>
         <p:nvSpPr>
           <p:cNvPr id="175" name="Smiley Face 173"/>
@@ -10625,6 +10147,9 @@
             <a:avLst/>
           </a:prstGeom>
           <a:ln w="12700">
+            <a:solidFill>
+              <a:srgbClr val="FF0000"/>
+            </a:solidFill>
             <a:tailEnd type="triangle"/>
           </a:ln>
         </p:spPr>
@@ -10661,6 +10186,9 @@
             <a:avLst/>
           </a:prstGeom>
           <a:ln w="12700">
+            <a:solidFill>
+              <a:srgbClr val="FF0000"/>
+            </a:solidFill>
             <a:tailEnd type="triangle"/>
           </a:ln>
         </p:spPr>
@@ -10687,7 +10215,7 @@
         </p:nvSpPr>
         <p:spPr>
           <a:xfrm>
-            <a:off x="2505865" y="2800040"/>
+            <a:off x="2565316" y="2948666"/>
             <a:ext cx="515815" cy="230832"/>
           </a:xfrm>
           <a:prstGeom prst="rect">
@@ -10709,43 +10237,6 @@
           </a:p>
         </p:txBody>
       </p:sp>
-      <p:cxnSp>
-        <p:nvCxnSpPr>
-          <p:cNvPr id="182" name="Straight Arrow Connector 134"/>
-          <p:cNvCxnSpPr/>
-          <p:nvPr/>
-        </p:nvCxnSpPr>
-        <p:spPr>
-          <a:xfrm>
-            <a:off x="1888322" y="2600559"/>
-            <a:ext cx="524607" cy="326015"/>
-          </a:xfrm>
-          <a:prstGeom prst="straightConnector1">
-            <a:avLst/>
-          </a:prstGeom>
-          <a:ln w="12700">
-            <a:solidFill>
-              <a:srgbClr val="C00000"/>
-            </a:solidFill>
-            <a:prstDash val="sysDot"/>
-            <a:tailEnd type="triangle"/>
-          </a:ln>
-        </p:spPr>
-        <p:style>
-          <a:lnRef idx="1">
-            <a:schemeClr val="accent1"/>
-          </a:lnRef>
-          <a:fillRef idx="0">
-            <a:schemeClr val="accent1"/>
-          </a:fillRef>
-          <a:effectRef idx="0">
-            <a:schemeClr val="accent1"/>
-          </a:effectRef>
-          <a:fontRef idx="minor">
-            <a:schemeClr val="tx1"/>
-          </a:fontRef>
-        </p:style>
-      </p:cxnSp>
       <p:cxnSp>
         <p:nvCxnSpPr>
           <p:cNvPr id="183" name="Straight Arrow Connector 135"/>
@@ -10764,6 +10255,9 @@
             <a:avLst/>
           </a:prstGeom>
           <a:ln w="12700">
+            <a:solidFill>
+              <a:srgbClr val="FF0000"/>
+            </a:solidFill>
             <a:tailEnd type="triangle"/>
           </a:ln>
         </p:spPr>
@@ -10782,6 +10276,654 @@
           </a:fontRef>
         </p:style>
       </p:cxnSp>
+      <p:sp>
+        <p:nvSpPr>
+          <p:cNvPr id="115" name="Rounded Rectangle 90"/>
+          <p:cNvSpPr/>
+          <p:nvPr/>
+        </p:nvSpPr>
+        <p:spPr>
+          <a:xfrm>
+            <a:off x="3844978" y="3264900"/>
+            <a:ext cx="1168400" cy="343877"/>
+          </a:xfrm>
+          <a:prstGeom prst="roundRect">
+            <a:avLst>
+              <a:gd name="adj" fmla="val 50000"/>
+            </a:avLst>
+          </a:prstGeom>
+          <a:solidFill>
+            <a:schemeClr val="bg1">
+              <a:lumMod val="85000"/>
+            </a:schemeClr>
+          </a:solidFill>
+        </p:spPr>
+        <p:style>
+          <a:lnRef idx="2">
+            <a:schemeClr val="accent1">
+              <a:shade val="50000"/>
+            </a:schemeClr>
+          </a:lnRef>
+          <a:fillRef idx="1">
+            <a:schemeClr val="accent1"/>
+          </a:fillRef>
+          <a:effectRef idx="0">
+            <a:schemeClr val="accent1"/>
+          </a:effectRef>
+          <a:fontRef idx="minor">
+            <a:schemeClr val="lt1"/>
+          </a:fontRef>
+        </p:style>
+        <p:txBody>
+          <a:bodyPr rtlCol="0" anchor="ctr"/>
+          <a:lstStyle/>
+          <a:p>
+            <a:pPr algn="ctr"/>
+            <a:r>
+              <a:rPr lang="en-US" sz="900" dirty="0">
+                <a:solidFill>
+                  <a:schemeClr val="tx1"/>
+                </a:solidFill>
+              </a:rPr>
+              <a:t>team/main</a:t>
+            </a:r>
+            <a:endParaRPr lang="en-US" sz="900" dirty="0">
+              <a:solidFill>
+                <a:schemeClr val="tx1"/>
+              </a:solidFill>
+            </a:endParaRPr>
+          </a:p>
+        </p:txBody>
+      </p:sp>
+      <p:cxnSp>
+        <p:nvCxnSpPr>
+          <p:cNvPr id="184" name="Elbow Connector 183"/>
+          <p:cNvCxnSpPr>
+            <a:stCxn id="91" idx="1"/>
+            <a:endCxn id="115" idx="1"/>
+          </p:cNvCxnSpPr>
+          <p:nvPr/>
+        </p:nvCxnSpPr>
+        <p:spPr>
+          <a:xfrm rot="10800000" flipH="1" flipV="1">
+            <a:off x="422650" y="2397651"/>
+            <a:ext cx="3422327" cy="1039188"/>
+          </a:xfrm>
+          <a:prstGeom prst="bentConnector3">
+            <a:avLst>
+              <a:gd name="adj1" fmla="val -6680"/>
+            </a:avLst>
+          </a:prstGeom>
+          <a:ln w="12700">
+            <a:solidFill>
+              <a:srgbClr val="00B050"/>
+            </a:solidFill>
+            <a:prstDash val="dash"/>
+            <a:tailEnd type="triangle"/>
+          </a:ln>
+        </p:spPr>
+        <p:style>
+          <a:lnRef idx="1">
+            <a:schemeClr val="accent1"/>
+          </a:lnRef>
+          <a:fillRef idx="0">
+            <a:schemeClr val="accent1"/>
+          </a:fillRef>
+          <a:effectRef idx="0">
+            <a:schemeClr val="accent1"/>
+          </a:effectRef>
+          <a:fontRef idx="minor">
+            <a:schemeClr val="tx1"/>
+          </a:fontRef>
+        </p:style>
+      </p:cxnSp>
+      <p:cxnSp>
+        <p:nvCxnSpPr>
+          <p:cNvPr id="6" name="Straight Arrow Connector 5"/>
+          <p:cNvCxnSpPr/>
+          <p:nvPr/>
+        </p:nvCxnSpPr>
+        <p:spPr>
+          <a:xfrm>
+            <a:off x="6122601" y="3264900"/>
+            <a:ext cx="441904" cy="0"/>
+          </a:xfrm>
+          <a:prstGeom prst="straightConnector1">
+            <a:avLst/>
+          </a:prstGeom>
+          <a:ln w="12700">
+            <a:solidFill>
+              <a:srgbClr val="00B050"/>
+            </a:solidFill>
+            <a:prstDash val="dash"/>
+            <a:tailEnd type="triangle"/>
+          </a:ln>
+        </p:spPr>
+        <p:style>
+          <a:lnRef idx="1">
+            <a:schemeClr val="accent1"/>
+          </a:lnRef>
+          <a:fillRef idx="0">
+            <a:schemeClr val="accent1"/>
+          </a:fillRef>
+          <a:effectRef idx="0">
+            <a:schemeClr val="accent1"/>
+          </a:effectRef>
+          <a:fontRef idx="minor">
+            <a:schemeClr val="tx1"/>
+          </a:fontRef>
+        </p:style>
+      </p:cxnSp>
+      <p:sp>
+        <p:nvSpPr>
+          <p:cNvPr id="185" name="TextBox 127"/>
+          <p:cNvSpPr txBox="1"/>
+          <p:nvPr/>
+        </p:nvSpPr>
+        <p:spPr>
+          <a:xfrm>
+            <a:off x="6559622" y="3145832"/>
+            <a:ext cx="731328" cy="230832"/>
+          </a:xfrm>
+          <a:prstGeom prst="rect">
+            <a:avLst/>
+          </a:prstGeom>
+          <a:noFill/>
+          <a:ln>
+            <a:noFill/>
+          </a:ln>
+        </p:spPr>
+        <p:txBody>
+          <a:bodyPr wrap="square" rtlCol="0">
+            <a:spAutoFit/>
+          </a:bodyPr>
+          <a:lstStyle/>
+          <a:p>
+            <a:pPr algn="ctr"/>
+            <a:r>
+              <a:rPr lang="en-US" sz="900" dirty="0" smtClean="0">
+                <a:solidFill>
+                  <a:srgbClr val="00B050"/>
+                </a:solidFill>
+              </a:rPr>
+              <a:t>Dry run</a:t>
+            </a:r>
+            <a:endParaRPr lang="en-US" sz="900" dirty="0">
+              <a:solidFill>
+                <a:srgbClr val="00B050"/>
+              </a:solidFill>
+            </a:endParaRPr>
+          </a:p>
+        </p:txBody>
+      </p:sp>
+      <p:cxnSp>
+        <p:nvCxnSpPr>
+          <p:cNvPr id="186" name="Straight Arrow Connector 185"/>
+          <p:cNvCxnSpPr/>
+          <p:nvPr/>
+        </p:nvCxnSpPr>
+        <p:spPr>
+          <a:xfrm>
+            <a:off x="6105696" y="2995783"/>
+            <a:ext cx="441904" cy="0"/>
+          </a:xfrm>
+          <a:prstGeom prst="straightConnector1">
+            <a:avLst/>
+          </a:prstGeom>
+          <a:ln w="12700">
+            <a:solidFill>
+              <a:srgbClr val="FF0000"/>
+            </a:solidFill>
+            <a:tailEnd type="triangle"/>
+          </a:ln>
+        </p:spPr>
+        <p:style>
+          <a:lnRef idx="1">
+            <a:schemeClr val="accent1"/>
+          </a:lnRef>
+          <a:fillRef idx="0">
+            <a:schemeClr val="accent1"/>
+          </a:fillRef>
+          <a:effectRef idx="0">
+            <a:schemeClr val="accent1"/>
+          </a:effectRef>
+          <a:fontRef idx="minor">
+            <a:schemeClr val="tx1"/>
+          </a:fontRef>
+        </p:style>
+      </p:cxnSp>
+      <p:sp>
+        <p:nvSpPr>
+          <p:cNvPr id="187" name="TextBox 127"/>
+          <p:cNvSpPr txBox="1"/>
+          <p:nvPr/>
+        </p:nvSpPr>
+        <p:spPr>
+          <a:xfrm>
+            <a:off x="6542717" y="2876715"/>
+            <a:ext cx="731328" cy="230832"/>
+          </a:xfrm>
+          <a:prstGeom prst="rect">
+            <a:avLst/>
+          </a:prstGeom>
+          <a:noFill/>
+          <a:ln>
+            <a:noFill/>
+          </a:ln>
+        </p:spPr>
+        <p:txBody>
+          <a:bodyPr wrap="square" rtlCol="0">
+            <a:spAutoFit/>
+          </a:bodyPr>
+          <a:lstStyle/>
+          <a:p>
+            <a:pPr algn="ctr"/>
+            <a:r>
+              <a:rPr lang="en-US" sz="900" dirty="0" smtClean="0">
+                <a:solidFill>
+                  <a:srgbClr val="FF0000"/>
+                </a:solidFill>
+              </a:rPr>
+              <a:t>Actual PE</a:t>
+            </a:r>
+            <a:endParaRPr lang="en-US" sz="900" dirty="0">
+              <a:solidFill>
+                <a:srgbClr val="FF0000"/>
+              </a:solidFill>
+            </a:endParaRPr>
+          </a:p>
+        </p:txBody>
+      </p:sp>
+      <p:sp>
+        <p:nvSpPr>
+          <p:cNvPr id="188" name="TextBox 114"/>
+          <p:cNvSpPr txBox="1"/>
+          <p:nvPr/>
+        </p:nvSpPr>
+        <p:spPr>
+          <a:xfrm>
+            <a:off x="667660" y="3428969"/>
+            <a:ext cx="515815" cy="230832"/>
+          </a:xfrm>
+          <a:prstGeom prst="rect">
+            <a:avLst/>
+          </a:prstGeom>
+          <a:noFill/>
+        </p:spPr>
+        <p:txBody>
+          <a:bodyPr wrap="square" rtlCol="0">
+            <a:spAutoFit/>
+          </a:bodyPr>
+          <a:lstStyle/>
+          <a:p>
+            <a:r>
+              <a:rPr lang="en-US" sz="900" dirty="0" smtClean="0"/>
+              <a:t>script</a:t>
+            </a:r>
+            <a:endParaRPr lang="en-US" sz="900" dirty="0"/>
+          </a:p>
+        </p:txBody>
+      </p:sp>
+      <p:sp>
+        <p:nvSpPr>
+          <p:cNvPr id="7" name="Flowchart: Connector 6"/>
+          <p:cNvSpPr/>
+          <p:nvPr/>
+        </p:nvSpPr>
+        <p:spPr>
+          <a:xfrm>
+            <a:off x="2357190" y="3307823"/>
+            <a:ext cx="344060" cy="263154"/>
+          </a:xfrm>
+          <a:prstGeom prst="flowChartConnector">
+            <a:avLst/>
+          </a:prstGeom>
+          <a:solidFill>
+            <a:schemeClr val="bg1"/>
+          </a:solidFill>
+          <a:ln>
+            <a:solidFill>
+              <a:srgbClr val="00B050"/>
+            </a:solidFill>
+          </a:ln>
+        </p:spPr>
+        <p:style>
+          <a:lnRef idx="2">
+            <a:schemeClr val="accent1">
+              <a:shade val="50000"/>
+            </a:schemeClr>
+          </a:lnRef>
+          <a:fillRef idx="1">
+            <a:schemeClr val="accent1"/>
+          </a:fillRef>
+          <a:effectRef idx="0">
+            <a:schemeClr val="accent1"/>
+          </a:effectRef>
+          <a:fontRef idx="minor">
+            <a:schemeClr val="lt1"/>
+          </a:fontRef>
+        </p:style>
+        <p:txBody>
+          <a:bodyPr lIns="0" tIns="0" rIns="0" bIns="0" rtlCol="0" anchor="ctr"/>
+          <a:lstStyle/>
+          <a:p>
+            <a:pPr algn="ctr"/>
+            <a:r>
+              <a:rPr lang="en-US" sz="1000" dirty="0" smtClean="0">
+                <a:solidFill>
+                  <a:srgbClr val="00B050"/>
+                </a:solidFill>
+              </a:rPr>
+              <a:t>S1c</a:t>
+            </a:r>
+            <a:endParaRPr lang="en-US" sz="1000" dirty="0">
+              <a:solidFill>
+                <a:srgbClr val="00B050"/>
+              </a:solidFill>
+            </a:endParaRPr>
+          </a:p>
+        </p:txBody>
+      </p:sp>
+      <p:sp>
+        <p:nvSpPr>
+          <p:cNvPr id="189" name="Flowchart: Connector 188"/>
+          <p:cNvSpPr/>
+          <p:nvPr/>
+        </p:nvSpPr>
+        <p:spPr>
+          <a:xfrm>
+            <a:off x="644740" y="2735415"/>
+            <a:ext cx="382031" cy="263154"/>
+          </a:xfrm>
+          <a:prstGeom prst="flowChartConnector">
+            <a:avLst/>
+          </a:prstGeom>
+          <a:solidFill>
+            <a:schemeClr val="bg1"/>
+          </a:solidFill>
+          <a:ln>
+            <a:solidFill>
+              <a:srgbClr val="FF0000"/>
+            </a:solidFill>
+          </a:ln>
+        </p:spPr>
+        <p:style>
+          <a:lnRef idx="2">
+            <a:schemeClr val="accent1">
+              <a:shade val="50000"/>
+            </a:schemeClr>
+          </a:lnRef>
+          <a:fillRef idx="1">
+            <a:schemeClr val="accent1"/>
+          </a:fillRef>
+          <a:effectRef idx="0">
+            <a:schemeClr val="accent1"/>
+          </a:effectRef>
+          <a:fontRef idx="minor">
+            <a:schemeClr val="lt1"/>
+          </a:fontRef>
+        </p:style>
+        <p:txBody>
+          <a:bodyPr lIns="0" tIns="0" rIns="0" bIns="0" rtlCol="0" anchor="ctr"/>
+          <a:lstStyle/>
+          <a:p>
+            <a:pPr algn="ctr"/>
+            <a:r>
+              <a:rPr lang="en-US" sz="1000" dirty="0" smtClean="0">
+                <a:solidFill>
+                  <a:srgbClr val="FF0000"/>
+                </a:solidFill>
+              </a:rPr>
+              <a:t>S1a</a:t>
+            </a:r>
+            <a:endParaRPr lang="en-US" sz="1000" dirty="0">
+              <a:solidFill>
+                <a:srgbClr val="FF0000"/>
+              </a:solidFill>
+            </a:endParaRPr>
+          </a:p>
+        </p:txBody>
+      </p:sp>
+      <p:sp>
+        <p:nvSpPr>
+          <p:cNvPr id="190" name="Flowchart: Connector 189"/>
+          <p:cNvSpPr/>
+          <p:nvPr/>
+        </p:nvSpPr>
+        <p:spPr>
+          <a:xfrm>
+            <a:off x="2336346" y="2714960"/>
+            <a:ext cx="382031" cy="263154"/>
+          </a:xfrm>
+          <a:prstGeom prst="flowChartConnector">
+            <a:avLst/>
+          </a:prstGeom>
+          <a:solidFill>
+            <a:schemeClr val="bg1"/>
+          </a:solidFill>
+          <a:ln>
+            <a:solidFill>
+              <a:srgbClr val="FF0000"/>
+            </a:solidFill>
+          </a:ln>
+        </p:spPr>
+        <p:style>
+          <a:lnRef idx="2">
+            <a:schemeClr val="accent1">
+              <a:shade val="50000"/>
+            </a:schemeClr>
+          </a:lnRef>
+          <a:fillRef idx="1">
+            <a:schemeClr val="accent1"/>
+          </a:fillRef>
+          <a:effectRef idx="0">
+            <a:schemeClr val="accent1"/>
+          </a:effectRef>
+          <a:fontRef idx="minor">
+            <a:schemeClr val="lt1"/>
+          </a:fontRef>
+        </p:style>
+        <p:txBody>
+          <a:bodyPr lIns="0" tIns="0" rIns="0" bIns="0" rtlCol="0" anchor="ctr"/>
+          <a:lstStyle/>
+          <a:p>
+            <a:pPr algn="ctr"/>
+            <a:r>
+              <a:rPr lang="en-US" sz="1000" dirty="0" smtClean="0">
+                <a:solidFill>
+                  <a:srgbClr val="FF0000"/>
+                </a:solidFill>
+              </a:rPr>
+              <a:t>S1b</a:t>
+            </a:r>
+            <a:endParaRPr lang="en-US" sz="1000" dirty="0">
+              <a:solidFill>
+                <a:srgbClr val="FF0000"/>
+              </a:solidFill>
+            </a:endParaRPr>
+          </a:p>
+        </p:txBody>
+      </p:sp>
+      <p:sp>
+        <p:nvSpPr>
+          <p:cNvPr id="191" name="Flowchart: Connector 190"/>
+          <p:cNvSpPr/>
+          <p:nvPr/>
+        </p:nvSpPr>
+        <p:spPr>
+          <a:xfrm>
+            <a:off x="3314886" y="2259231"/>
+            <a:ext cx="260932" cy="263154"/>
+          </a:xfrm>
+          <a:prstGeom prst="flowChartConnector">
+            <a:avLst/>
+          </a:prstGeom>
+          <a:solidFill>
+            <a:schemeClr val="bg1"/>
+          </a:solidFill>
+          <a:ln>
+            <a:solidFill>
+              <a:srgbClr val="FF0000"/>
+            </a:solidFill>
+          </a:ln>
+        </p:spPr>
+        <p:style>
+          <a:lnRef idx="2">
+            <a:schemeClr val="accent1">
+              <a:shade val="50000"/>
+            </a:schemeClr>
+          </a:lnRef>
+          <a:fillRef idx="1">
+            <a:schemeClr val="accent1"/>
+          </a:fillRef>
+          <a:effectRef idx="0">
+            <a:schemeClr val="accent1"/>
+          </a:effectRef>
+          <a:fontRef idx="minor">
+            <a:schemeClr val="lt1"/>
+          </a:fontRef>
+        </p:style>
+        <p:txBody>
+          <a:bodyPr lIns="0" tIns="0" rIns="0" bIns="0" rtlCol="0" anchor="ctr"/>
+          <a:lstStyle/>
+          <a:p>
+            <a:pPr algn="ctr"/>
+            <a:r>
+              <a:rPr lang="en-US" sz="1000" dirty="0" smtClean="0">
+                <a:solidFill>
+                  <a:srgbClr val="FF0000"/>
+                </a:solidFill>
+              </a:rPr>
+              <a:t>S2</a:t>
+            </a:r>
+            <a:endParaRPr lang="en-US" sz="1000" dirty="0">
+              <a:solidFill>
+                <a:srgbClr val="FF0000"/>
+              </a:solidFill>
+            </a:endParaRPr>
+          </a:p>
+        </p:txBody>
+      </p:sp>
+      <p:sp>
+        <p:nvSpPr>
+          <p:cNvPr id="192" name="Flowchart: Connector 191"/>
+          <p:cNvSpPr/>
+          <p:nvPr/>
+        </p:nvSpPr>
+        <p:spPr>
+          <a:xfrm>
+            <a:off x="4882911" y="2266029"/>
+            <a:ext cx="260932" cy="263154"/>
+          </a:xfrm>
+          <a:prstGeom prst="flowChartConnector">
+            <a:avLst/>
+          </a:prstGeom>
+          <a:solidFill>
+            <a:schemeClr val="bg1"/>
+          </a:solidFill>
+          <a:ln>
+            <a:solidFill>
+              <a:srgbClr val="FF0000"/>
+            </a:solidFill>
+          </a:ln>
+        </p:spPr>
+        <p:style>
+          <a:lnRef idx="2">
+            <a:schemeClr val="accent1">
+              <a:shade val="50000"/>
+            </a:schemeClr>
+          </a:lnRef>
+          <a:fillRef idx="1">
+            <a:schemeClr val="accent1"/>
+          </a:fillRef>
+          <a:effectRef idx="0">
+            <a:schemeClr val="accent1"/>
+          </a:effectRef>
+          <a:fontRef idx="minor">
+            <a:schemeClr val="lt1"/>
+          </a:fontRef>
+        </p:style>
+        <p:txBody>
+          <a:bodyPr lIns="0" tIns="0" rIns="0" bIns="0" rtlCol="0" anchor="ctr"/>
+          <a:lstStyle/>
+          <a:p>
+            <a:pPr algn="ctr"/>
+            <a:r>
+              <a:rPr lang="en-US" sz="1000" dirty="0" smtClean="0">
+                <a:solidFill>
+                  <a:srgbClr val="FF0000"/>
+                </a:solidFill>
+              </a:rPr>
+              <a:t>S3</a:t>
+            </a:r>
+            <a:endParaRPr lang="en-US" sz="1000" dirty="0">
+              <a:solidFill>
+                <a:srgbClr val="FF0000"/>
+              </a:solidFill>
+            </a:endParaRPr>
+          </a:p>
+        </p:txBody>
+      </p:sp>
+      <p:sp>
+        <p:nvSpPr>
+          <p:cNvPr id="193" name="Flowchart: Connector 192"/>
+          <p:cNvSpPr/>
+          <p:nvPr/>
+        </p:nvSpPr>
+        <p:spPr>
+          <a:xfrm>
+            <a:off x="6950894" y="2251992"/>
+            <a:ext cx="260932" cy="263154"/>
+          </a:xfrm>
+          <a:prstGeom prst="flowChartConnector">
+            <a:avLst/>
+          </a:prstGeom>
+          <a:solidFill>
+            <a:schemeClr val="bg1"/>
+          </a:solidFill>
+          <a:ln>
+            <a:solidFill>
+              <a:srgbClr val="FF0000"/>
+            </a:solidFill>
+          </a:ln>
+        </p:spPr>
+        <p:style>
+          <a:lnRef idx="2">
+            <a:schemeClr val="accent1">
+              <a:shade val="50000"/>
+            </a:schemeClr>
+          </a:lnRef>
+          <a:fillRef idx="1">
+            <a:schemeClr val="accent1"/>
+          </a:fillRef>
+          <a:effectRef idx="0">
+            <a:schemeClr val="accent1"/>
+          </a:effectRef>
+          <a:fontRef idx="minor">
+            <a:schemeClr val="lt1"/>
+          </a:fontRef>
+        </p:style>
+        <p:txBody>
+          <a:bodyPr lIns="0" tIns="0" rIns="0" bIns="0" rtlCol="0" anchor="ctr"/>
+          <a:lstStyle/>
+          <a:p>
+            <a:pPr algn="ctr"/>
+            <a:r>
+              <a:rPr lang="en-US" sz="1000" dirty="0" smtClean="0">
+                <a:solidFill>
+                  <a:srgbClr val="FF0000"/>
+                </a:solidFill>
+              </a:rPr>
+              <a:t>S4</a:t>
+            </a:r>
+            <a:endParaRPr lang="en-US" sz="1000" dirty="0">
+              <a:solidFill>
+                <a:srgbClr val="FF0000"/>
+              </a:solidFill>
+            </a:endParaRPr>
+          </a:p>
+        </p:txBody>
+      </p:sp>
     </p:spTree>
     <p:extLst>
       <p:ext uri="{BB962C8B-B14F-4D97-AF65-F5344CB8AC3E}">

</xml_diff>